<commit_message>
Updated version of the presentation (final version)
</commit_message>
<xml_diff>
--- a/JamesSergeyRodrigoDefcon2012.pptx
+++ b/JamesSergeyRodrigoDefcon2012.pptx
@@ -9,8 +9,8 @@
   </p:notesMasterIdLst>
   <p:sldIdLst>
     <p:sldId id="256" r:id="rId2"/>
-    <p:sldId id="257" r:id="rId3"/>
-    <p:sldId id="258" r:id="rId4"/>
+    <p:sldId id="258" r:id="rId3"/>
+    <p:sldId id="313" r:id="rId4"/>
     <p:sldId id="261" r:id="rId5"/>
     <p:sldId id="265" r:id="rId6"/>
     <p:sldId id="267" r:id="rId7"/>
@@ -3721,7 +3721,7 @@
           <a:p>
             <a:r>
               <a:rPr lang="en-US" dirty="0" smtClean="0"/>
-              <a:t>ELF</a:t>
+              <a:t>ELF layout of process space</a:t>
             </a:r>
             <a:endParaRPr lang="en-US" dirty="0"/>
           </a:p>
@@ -3757,42 +3757,36 @@
           </a:xfrm>
         </p:spPr>
       </p:pic>
-      <p:sp>
-        <p:nvSpPr>
-          <p:cNvPr id="5" name="TextBox 4"/>
-          <p:cNvSpPr txBox="1"/>
+      <p:pic>
+        <p:nvPicPr>
+          <p:cNvPr id="3" name="Picture 2" descr="dwelf.jpg"/>
+          <p:cNvPicPr>
+            <a:picLocks noChangeAspect="1"/>
+          </p:cNvPicPr>
           <p:nvPr/>
-        </p:nvSpPr>
+        </p:nvPicPr>
+        <p:blipFill>
+          <a:blip r:embed="rId3">
+            <a:extLst>
+              <a:ext uri="{28A0092B-C50C-407E-A947-70E740481C1C}">
+                <a14:useLocalDpi xmlns:a14="http://schemas.microsoft.com/office/drawing/2010/main" val="0"/>
+              </a:ext>
+            </a:extLst>
+          </a:blip>
+          <a:stretch>
+            <a:fillRect/>
+          </a:stretch>
+        </p:blipFill>
         <p:spPr>
           <a:xfrm>
-            <a:off x="4445000" y="2429933"/>
-            <a:ext cx="4407276" cy="646331"/>
+            <a:off x="4449428" y="1417638"/>
+            <a:ext cx="3915645" cy="5164667"/>
           </a:xfrm>
           <a:prstGeom prst="rect">
             <a:avLst/>
           </a:prstGeom>
-          <a:noFill/>
         </p:spPr>
-        <p:txBody>
-          <a:bodyPr wrap="none" rtlCol="0">
-            <a:spAutoFit/>
-          </a:bodyPr>
-          <a:lstStyle/>
-          <a:p>
-            <a:r>
-              <a:rPr lang="en-US" dirty="0" smtClean="0"/>
-              <a:t>The executable has this format either on disk</a:t>
-            </a:r>
-          </a:p>
-          <a:p>
-            <a:r>
-              <a:rPr lang="en-US" dirty="0" smtClean="0"/>
-              <a:t>or in memory.</a:t>
-            </a:r>
-            <a:endParaRPr lang="en-US" dirty="0"/>
-          </a:p>
-        </p:txBody>
-      </p:sp>
+      </p:pic>
     </p:spTree>
     <p:extLst>
       <p:ext uri="{BB962C8B-B14F-4D97-AF65-F5344CB8AC3E}">
@@ -3863,10 +3857,15 @@
             <p:ph idx="1"/>
           </p:nvPr>
         </p:nvSpPr>
-        <p:spPr/>
+        <p:spPr>
+          <a:xfrm>
+            <a:off x="457200" y="1600200"/>
+            <a:ext cx="5469203" cy="4525963"/>
+          </a:xfrm>
+        </p:spPr>
         <p:txBody>
           <a:bodyPr>
-            <a:normAutofit fontScale="77500" lnSpcReduction="20000"/>
+            <a:normAutofit fontScale="70000" lnSpcReduction="20000"/>
           </a:bodyPr>
           <a:lstStyle/>
           <a:p>
@@ -3914,7 +3913,11 @@
           <a:p>
             <a:r>
               <a:rPr lang="en-US" dirty="0" smtClean="0"/>
-              <a:t>ELF Sections:  .</a:t>
+              <a:t>ELF Sections</a:t>
+            </a:r>
+            <a:r>
+              <a:rPr lang="en-US" dirty="0" smtClean="0"/>
+              <a:t>:  .</a:t>
             </a:r>
             <a:r>
               <a:rPr lang="en-US" dirty="0" err="1" smtClean="0"/>
@@ -3930,7 +3933,18 @@
             </a:r>
             <a:r>
               <a:rPr lang="en-US" dirty="0" smtClean="0"/>
-              <a:t>, .</a:t>
+              <a:t>, </a:t>
+            </a:r>
+            <a:r>
+              <a:rPr lang="en-US" dirty="0" smtClean="0"/>
+              <a:t/>
+            </a:r>
+            <a:br>
+              <a:rPr lang="en-US" dirty="0" smtClean="0"/>
+            </a:br>
+            <a:r>
+              <a:rPr lang="en-US" dirty="0" smtClean="0"/>
+              <a:t>.</a:t>
             </a:r>
             <a:r>
               <a:rPr lang="en-US" dirty="0" err="1" smtClean="0"/>
@@ -3938,7 +3952,11 @@
             </a:r>
             <a:r>
               <a:rPr lang="en-US" dirty="0" smtClean="0"/>
-              <a:t> are defined in the standard</a:t>
+              <a:t> </a:t>
+            </a:r>
+            <a:r>
+              <a:rPr lang="en-US" dirty="0" smtClean="0"/>
+              <a:t>are defined in the standard</a:t>
             </a:r>
           </a:p>
           <a:p>
@@ -3961,6 +3979,36 @@
           </a:p>
         </p:txBody>
       </p:sp>
+      <p:pic>
+        <p:nvPicPr>
+          <p:cNvPr id="3" name="Picture 2" descr="gimli_imdb.jpg"/>
+          <p:cNvPicPr>
+            <a:picLocks noChangeAspect="1"/>
+          </p:cNvPicPr>
+          <p:nvPr/>
+        </p:nvPicPr>
+        <p:blipFill>
+          <a:blip r:embed="rId3">
+            <a:extLst>
+              <a:ext uri="{28A0092B-C50C-407E-A947-70E740481C1C}">
+                <a14:useLocalDpi xmlns:a14="http://schemas.microsoft.com/office/drawing/2010/main" val="0"/>
+              </a:ext>
+            </a:extLst>
+          </a:blip>
+          <a:stretch>
+            <a:fillRect/>
+          </a:stretch>
+        </p:blipFill>
+        <p:spPr>
+          <a:xfrm>
+            <a:off x="5926403" y="1222277"/>
+            <a:ext cx="3217597" cy="5098480"/>
+          </a:xfrm>
+          <a:prstGeom prst="rect">
+            <a:avLst/>
+          </a:prstGeom>
+        </p:spPr>
+      </p:pic>
     </p:spTree>
     <p:extLst>
       <p:ext uri="{BB962C8B-B14F-4D97-AF65-F5344CB8AC3E}">
@@ -4080,13 +4128,8 @@
           <a:p>
             <a:r>
               <a:rPr lang="en-US" dirty="0" smtClean="0"/>
-              <a:t>As usual, the documentation </a:t>
-            </a:r>
-            <a:r>
-              <a:rPr lang="en-US" dirty="0" smtClean="0"/>
-              <a:t>is not perfect:</a:t>
-            </a:r>
-            <a:endParaRPr lang="en-US" dirty="0" smtClean="0"/>
+              <a:t>As usual, the documentation is not perfect:</a:t>
+            </a:r>
           </a:p>
           <a:p>
             <a:pPr lvl="1"/>
@@ -4099,11 +4142,7 @@
             <a:pPr lvl="1"/>
             <a:r>
               <a:rPr lang="en-US" dirty="0" smtClean="0"/>
-              <a:t>Partially </a:t>
-            </a:r>
-            <a:r>
-              <a:rPr lang="en-US" dirty="0" smtClean="0"/>
-              <a:t>defined in the ABI</a:t>
+              <a:t>Partially defined in the ABI</a:t>
             </a:r>
           </a:p>
           <a:p>
@@ -5088,21 +5127,7 @@
                 <a:latin typeface="Courier"/>
                 <a:cs typeface="Courier"/>
               </a:rPr>
-              <a:t> </a:t>
-            </a:r>
-            <a:r>
-              <a:rPr lang="en-US" sz="1200" dirty="0" smtClean="0">
-                <a:latin typeface="Courier"/>
-                <a:cs typeface="Courier"/>
-              </a:rPr>
-              <a:t>|    </a:t>
-            </a:r>
-            <a:r>
-              <a:rPr lang="en-US" sz="1200" dirty="0" smtClean="0">
-                <a:latin typeface="Courier"/>
-                <a:cs typeface="Courier"/>
-              </a:rPr>
-              <a:t>CFI = Call Frame Information</a:t>
+              <a:t> |    CFI = Call Frame Information</a:t>
             </a:r>
           </a:p>
           <a:p>
@@ -5126,45 +5151,20 @@
                 <a:latin typeface="Courier"/>
                 <a:cs typeface="Courier"/>
               </a:rPr>
-              <a:t>     |     | CIE           | </a:t>
-            </a:r>
+              <a:t>     |     | CIE           | |    CIE = Common Information Entry</a:t>
+            </a:r>
+          </a:p>
+          <a:p>
+            <a:pPr marL="0" indent="0">
+              <a:buNone/>
+            </a:pPr>
             <a:r>
               <a:rPr lang="en-US" sz="1200" dirty="0" smtClean="0">
                 <a:latin typeface="Courier"/>
                 <a:cs typeface="Courier"/>
               </a:rPr>
-              <a:t>|    </a:t>
-            </a:r>
-            <a:r>
-              <a:rPr lang="en-US" sz="1200" dirty="0" smtClean="0">
-                <a:latin typeface="Courier"/>
-                <a:cs typeface="Courier"/>
-              </a:rPr>
-              <a:t>CIE = Common Information Entry</a:t>
-            </a:r>
-          </a:p>
-          <a:p>
-            <a:pPr marL="0" indent="0">
-              <a:buNone/>
-            </a:pPr>
-            <a:r>
-              <a:rPr lang="en-US" sz="1200" dirty="0" smtClean="0">
-                <a:latin typeface="Courier"/>
-                <a:cs typeface="Courier"/>
-              </a:rPr>
-              <a:t>     |     '--------------</a:t>
-            </a:r>
-            <a:r>
-              <a:rPr lang="en-US" sz="1200" dirty="0" smtClean="0">
-                <a:latin typeface="Courier"/>
-                <a:cs typeface="Courier"/>
-              </a:rPr>
-              <a:t>-’ |</a:t>
-            </a:r>
-            <a:endParaRPr lang="en-US" sz="1200" dirty="0" smtClean="0">
-              <a:latin typeface="Courier"/>
-              <a:cs typeface="Courier"/>
-            </a:endParaRPr>
+              <a:t>     |     '---------------’ |</a:t>
+            </a:r>
           </a:p>
           <a:p>
             <a:pPr marL="0" indent="0">
@@ -5187,19 +5187,20 @@
                 <a:latin typeface="Courier"/>
                 <a:cs typeface="Courier"/>
               </a:rPr>
-              <a:t>     |     |     .-------. | </a:t>
-            </a:r>
+              <a:t>     |     |     .-------. | |</a:t>
+            </a:r>
+          </a:p>
+          <a:p>
+            <a:pPr marL="0" indent="0">
+              <a:buNone/>
+            </a:pPr>
             <a:r>
               <a:rPr lang="en-US" sz="1200" dirty="0" smtClean="0">
                 <a:latin typeface="Courier"/>
                 <a:cs typeface="Courier"/>
               </a:rPr>
-              <a:t>|</a:t>
-            </a:r>
-            <a:endParaRPr lang="en-US" sz="1200" dirty="0" smtClean="0">
-              <a:latin typeface="Courier"/>
-              <a:cs typeface="Courier"/>
-            </a:endParaRPr>
+              <a:t>     |     |     | *LSDA | | |    LSDA = Language Specific Data Area</a:t>
+            </a:r>
           </a:p>
           <a:p>
             <a:pPr marL="0" indent="0">
@@ -5210,68 +5211,20 @@
                 <a:latin typeface="Courier"/>
                 <a:cs typeface="Courier"/>
               </a:rPr>
-              <a:t>     |     |     | *LSDA </a:t>
-            </a:r>
+              <a:t>     |     |     '-------' | |</a:t>
+            </a:r>
+          </a:p>
+          <a:p>
+            <a:pPr marL="0" indent="0">
+              <a:buNone/>
+            </a:pPr>
             <a:r>
               <a:rPr lang="en-US" sz="1200" dirty="0" smtClean="0">
                 <a:latin typeface="Courier"/>
                 <a:cs typeface="Courier"/>
               </a:rPr>
-              <a:t>| | |    </a:t>
-            </a:r>
-            <a:r>
-              <a:rPr lang="en-US" sz="1200" dirty="0" smtClean="0">
-                <a:latin typeface="Courier"/>
-                <a:cs typeface="Courier"/>
-              </a:rPr>
-              <a:t>LSDA = Language Specific Data Area</a:t>
-            </a:r>
-          </a:p>
-          <a:p>
-            <a:pPr marL="0" indent="0">
-              <a:buNone/>
-            </a:pPr>
-            <a:r>
-              <a:rPr lang="en-US" sz="1200" dirty="0" smtClean="0">
-                <a:latin typeface="Courier"/>
-                <a:cs typeface="Courier"/>
-              </a:rPr>
-              <a:t>     |     |     '-------' | </a:t>
-            </a:r>
-            <a:r>
-              <a:rPr lang="en-US" sz="1200" dirty="0" smtClean="0">
-                <a:latin typeface="Courier"/>
-                <a:cs typeface="Courier"/>
-              </a:rPr>
-              <a:t>|</a:t>
-            </a:r>
-            <a:endParaRPr lang="en-US" sz="1200" dirty="0" smtClean="0">
-              <a:latin typeface="Courier"/>
-              <a:cs typeface="Courier"/>
-            </a:endParaRPr>
-          </a:p>
-          <a:p>
-            <a:pPr marL="0" indent="0">
-              <a:buNone/>
-            </a:pPr>
-            <a:r>
-              <a:rPr lang="en-US" sz="1200" dirty="0" smtClean="0">
-                <a:latin typeface="Courier"/>
-                <a:cs typeface="Courier"/>
-              </a:rPr>
-              <a:t>     |     '--------------</a:t>
-            </a:r>
-            <a:r>
-              <a:rPr lang="en-US" sz="1200" dirty="0" smtClean="0">
-                <a:latin typeface="Courier"/>
-                <a:cs typeface="Courier"/>
-              </a:rPr>
-              <a:t>-’ |</a:t>
-            </a:r>
-            <a:endParaRPr lang="en-US" sz="1200" dirty="0" smtClean="0">
-              <a:latin typeface="Courier"/>
-              <a:cs typeface="Courier"/>
-            </a:endParaRPr>
+              <a:t>     |     '---------------’ |</a:t>
+            </a:r>
           </a:p>
           <a:p>
             <a:pPr marL="0" indent="0">
@@ -5961,7 +5914,11 @@
           <a:p>
             <a:r>
               <a:rPr lang="en-US" dirty="0" smtClean="0"/>
-              <a:t>Work as an assembly language (unexpected computations)</a:t>
+              <a:t>Works </a:t>
+            </a:r>
+            <a:r>
+              <a:rPr lang="en-US" dirty="0" smtClean="0"/>
+              <a:t>as an assembly language (unexpected computations)</a:t>
             </a:r>
           </a:p>
           <a:p>
@@ -5998,7 +5955,15 @@
             <a:pPr lvl="1"/>
             <a:r>
               <a:rPr lang="en-US" dirty="0" smtClean="0"/>
-              <a:t>Cannot write to register/memory (but we can force out-of-order code execution and obtain writes)</a:t>
+              <a:t>Cannot write to </a:t>
+            </a:r>
+            <a:r>
+              <a:rPr lang="en-US" dirty="0" smtClean="0"/>
+              <a:t>memory </a:t>
+            </a:r>
+            <a:r>
+              <a:rPr lang="en-US" dirty="0" smtClean="0"/>
+              <a:t>(but we can force out-of-order code execution and obtain writes)</a:t>
             </a:r>
           </a:p>
           <a:p>
@@ -6028,13 +5993,8 @@
             </a:r>
             <a:r>
               <a:rPr lang="en-US" dirty="0" smtClean="0"/>
-              <a:t>-saved </a:t>
-            </a:r>
-            <a:r>
-              <a:rPr lang="en-US" smtClean="0"/>
-              <a:t>register though)</a:t>
-            </a:r>
-            <a:endParaRPr lang="en-US" dirty="0" smtClean="0"/>
+              <a:t>-saved register though)</a:t>
+            </a:r>
           </a:p>
           <a:p>
             <a:pPr lvl="1"/>
@@ -6181,12 +6141,12 @@
               <a:t>CFA is </a:t>
             </a:r>
             <a:r>
-              <a:rPr lang="en-US" dirty="0" err="1" smtClean="0"/>
-              <a:t>calculed</a:t>
-            </a:r>
-            <a:r>
-              <a:rPr lang="en-US" dirty="0" smtClean="0"/>
-              <a:t> starting from register R and offset OFF</a:t>
+              <a:rPr lang="en-US" dirty="0" smtClean="0"/>
+              <a:t>calculated </a:t>
+            </a:r>
+            <a:r>
+              <a:rPr lang="en-US" dirty="0" smtClean="0"/>
+              <a:t>starting from register R and offset OFF</a:t>
             </a:r>
           </a:p>
           <a:p>
@@ -6210,12 +6170,12 @@
               <a:t>Register R is </a:t>
             </a:r>
             <a:r>
-              <a:rPr lang="en-US" dirty="0" err="1" smtClean="0"/>
-              <a:t>restaured</a:t>
-            </a:r>
-            <a:r>
-              <a:rPr lang="en-US" dirty="0" smtClean="0"/>
-              <a:t> from the value in CFA OFF</a:t>
+              <a:rPr lang="en-US" dirty="0" smtClean="0"/>
+              <a:t>restored </a:t>
+            </a:r>
+            <a:r>
+              <a:rPr lang="en-US" dirty="0" smtClean="0"/>
+              <a:t>from the value in CFA OFF</a:t>
             </a:r>
           </a:p>
           <a:p>
@@ -6243,12 +6203,12 @@
               <a:t>Register R1 is </a:t>
             </a:r>
             <a:r>
-              <a:rPr lang="en-US" dirty="0" err="1" smtClean="0"/>
-              <a:t>restaured</a:t>
-            </a:r>
-            <a:r>
-              <a:rPr lang="en-US" dirty="0" smtClean="0"/>
-              <a:t> with the contents of R2</a:t>
+              <a:rPr lang="en-US" dirty="0" smtClean="0"/>
+              <a:t>restored </a:t>
+            </a:r>
+            <a:r>
+              <a:rPr lang="en-US" dirty="0" smtClean="0"/>
+              <a:t>with the contents of R2</a:t>
             </a:r>
           </a:p>
           <a:p>
@@ -6310,7 +6270,7 @@
           <a:p>
             <a:r>
               <a:rPr lang="en-US" dirty="0" smtClean="0"/>
-              <a:t>Credits</a:t>
+              <a:t>Motivation</a:t>
             </a:r>
             <a:endParaRPr lang="en-US" dirty="0"/>
           </a:p>
@@ -6329,113 +6289,52 @@
         <p:spPr/>
         <p:txBody>
           <a:bodyPr>
-            <a:normAutofit fontScale="92500" lnSpcReduction="10000"/>
+            <a:normAutofit/>
           </a:bodyPr>
           <a:lstStyle/>
           <a:p>
             <a:r>
               <a:rPr lang="en-US" dirty="0" smtClean="0"/>
-              <a:t>This presentation combines ideas, research, discussions from the following personnel:</a:t>
-            </a:r>
-          </a:p>
-          <a:p>
-            <a:pPr lvl="1"/>
-            <a:r>
-              <a:rPr lang="en-US" dirty="0" smtClean="0"/>
-              <a:t>Sergey </a:t>
-            </a:r>
-            <a:r>
-              <a:rPr lang="en-US" dirty="0" err="1" smtClean="0"/>
-              <a:t>Bratus</a:t>
-            </a:r>
-            <a:r>
-              <a:rPr lang="en-US" dirty="0" smtClean="0"/>
-              <a:t> </a:t>
-            </a:r>
-            <a:r>
-              <a:rPr lang="en-US" dirty="0" smtClean="0"/>
-              <a:t>(</a:t>
-            </a:r>
-            <a:r>
-              <a:rPr lang="en-US" dirty="0" smtClean="0"/>
-              <a:t>“</a:t>
-            </a:r>
-            <a:r>
-              <a:rPr lang="en-US" dirty="0" smtClean="0"/>
-              <a:t>Insecurity Theory</a:t>
-            </a:r>
-            <a:r>
-              <a:rPr lang="en-US" dirty="0" smtClean="0"/>
-              <a:t>”</a:t>
-            </a:r>
-            <a:r>
-              <a:rPr lang="en-US" dirty="0" smtClean="0"/>
-              <a:t>, </a:t>
-            </a:r>
-            <a:r>
-              <a:rPr lang="en-US" dirty="0" smtClean="0"/>
-              <a:t>Exploiting the Hard-working Dwarf)</a:t>
-            </a:r>
-          </a:p>
-          <a:p>
-            <a:pPr lvl="1"/>
-            <a:r>
-              <a:rPr lang="en-US" dirty="0" smtClean="0"/>
-              <a:t>Meredith Patterson (</a:t>
-            </a:r>
-            <a:r>
-              <a:rPr lang="en-US" dirty="0" err="1" smtClean="0"/>
-              <a:t>Langsec</a:t>
-            </a:r>
-            <a:r>
-              <a:rPr lang="en-US" dirty="0" smtClean="0"/>
-              <a:t>)</a:t>
-            </a:r>
-          </a:p>
-          <a:p>
-            <a:pPr lvl="1"/>
-            <a:r>
-              <a:rPr lang="en-US" dirty="0" smtClean="0"/>
-              <a:t>R.I.P. Len </a:t>
-            </a:r>
-            <a:r>
-              <a:rPr lang="en-US" dirty="0" err="1" smtClean="0"/>
-              <a:t>Sassaman</a:t>
-            </a:r>
-            <a:r>
-              <a:rPr lang="en-US" dirty="0" smtClean="0"/>
-              <a:t> (</a:t>
-            </a:r>
-            <a:r>
-              <a:rPr lang="en-US" dirty="0" err="1" smtClean="0"/>
-              <a:t>Langsec</a:t>
-            </a:r>
-            <a:r>
-              <a:rPr lang="en-US" dirty="0" smtClean="0"/>
-              <a:t>)</a:t>
-            </a:r>
-          </a:p>
-          <a:p>
-            <a:pPr lvl="1"/>
-            <a:r>
-              <a:rPr lang="en-US" dirty="0" smtClean="0"/>
-              <a:t>James Oakley (Exploiting the Hard-working Dwarf -&gt; everything related to that, including Katana)</a:t>
-            </a:r>
-          </a:p>
-          <a:p>
-            <a:pPr lvl="1"/>
-            <a:r>
-              <a:rPr lang="en-US" dirty="0" smtClean="0"/>
-              <a:t>Rodrigo Rubira Branco (Exploiting the Hard-working Dwarf -&gt; exploitation, implementation details, research organization)</a:t>
-            </a:r>
-            <a:endParaRPr lang="en-US" dirty="0"/>
+              <a:t>Software exploitation is </a:t>
+            </a:r>
+            <a:r>
+              <a:rPr lang="en-US" b="1" dirty="0" smtClean="0"/>
+              <a:t>not generic</a:t>
+            </a:r>
+            <a:r>
+              <a:rPr lang="en-US" dirty="0" smtClean="0"/>
+              <a:t> anymore</a:t>
+            </a:r>
+          </a:p>
+          <a:p>
+            <a:r>
+              <a:rPr lang="en-US" dirty="0" smtClean="0"/>
+              <a:t>There are different exploitation primitives in different contexts</a:t>
+            </a:r>
+          </a:p>
+          <a:p>
+            <a:r>
+              <a:rPr lang="en-US" dirty="0" smtClean="0"/>
+              <a:t>A modern exploitation technique shows how to take advantage of those primitives</a:t>
+            </a:r>
+          </a:p>
+          <a:p>
+            <a:r>
+              <a:rPr lang="en-US" dirty="0" smtClean="0"/>
+              <a:t>Targets as written are capable of many more computations that intended.  </a:t>
+            </a:r>
+            <a:r>
+              <a:rPr lang="en-US" b="1" dirty="0" smtClean="0"/>
+              <a:t>Exploitation is proof of that</a:t>
+            </a:r>
+            <a:endParaRPr lang="en-US" b="1" dirty="0"/>
           </a:p>
         </p:txBody>
       </p:sp>
     </p:spTree>
     <p:extLst>
       <p:ext uri="{BB962C8B-B14F-4D97-AF65-F5344CB8AC3E}">
-        <p14:creationId xmlns:p14="http://schemas.microsoft.com/office/powerpoint/2010/main" val="3639490926"/>
+        <p14:creationId xmlns:p14="http://schemas.microsoft.com/office/powerpoint/2010/main" val="1190065990"/>
       </p:ext>
     </p:extLst>
   </p:cSld>
@@ -6531,7 +6430,23 @@
           <a:p>
             <a:r>
               <a:rPr lang="en-US" dirty="0" smtClean="0"/>
-              <a:t>In a FDE, lines heritage from instruction lines above them</a:t>
+              <a:t>In </a:t>
+            </a:r>
+            <a:r>
+              <a:rPr lang="en-US" dirty="0" smtClean="0"/>
+              <a:t>FDE</a:t>
+            </a:r>
+            <a:r>
+              <a:rPr lang="en-US" dirty="0" smtClean="0"/>
+              <a:t>, lines </a:t>
+            </a:r>
+            <a:r>
+              <a:rPr lang="en-US" dirty="0" smtClean="0"/>
+              <a:t>inherit from </a:t>
+            </a:r>
+            <a:r>
+              <a:rPr lang="en-US" dirty="0" smtClean="0"/>
+              <a:t>instruction lines above them</a:t>
             </a:r>
             <a:endParaRPr lang="en-US" dirty="0" smtClean="0">
               <a:effectLst/>
@@ -7342,11 +7257,19 @@
             <a:pPr lvl="1"/>
             <a:r>
               <a:rPr lang="en-US" dirty="0" smtClean="0"/>
-              <a:t>Arithmetic:  DW OP plus, DW OP </a:t>
-            </a:r>
-            <a:r>
-              <a:rPr lang="en-US" dirty="0" err="1" smtClean="0"/>
-              <a:t>mul</a:t>
+              <a:t>Arithmetic:  </a:t>
+            </a:r>
+            <a:r>
+              <a:rPr lang="en-US" dirty="0" err="1" smtClean="0"/>
+              <a:t>DW_OP_plus</a:t>
+            </a:r>
+            <a:r>
+              <a:rPr lang="en-US" dirty="0" smtClean="0"/>
+              <a:t>, </a:t>
+            </a:r>
+            <a:r>
+              <a:rPr lang="en-US" dirty="0" err="1" smtClean="0"/>
+              <a:t>DW_OP_mul</a:t>
             </a:r>
             <a:r>
               <a:rPr lang="en-US" dirty="0" smtClean="0"/>
@@ -9278,7 +9201,7 @@
           <a:p>
             <a:r>
               <a:rPr lang="en-US" dirty="0" smtClean="0"/>
-              <a:t>Motivation</a:t>
+              <a:t>This Talk in One Minute</a:t>
             </a:r>
             <a:endParaRPr lang="en-US" dirty="0"/>
           </a:p>
@@ -9296,66 +9219,108 @@
         </p:nvSpPr>
         <p:spPr/>
         <p:txBody>
-          <a:bodyPr>
-            <a:normAutofit/>
-          </a:bodyPr>
+          <a:bodyPr/>
           <a:lstStyle/>
           <a:p>
             <a:r>
               <a:rPr lang="en-US" dirty="0" smtClean="0"/>
-              <a:t>Software exploitation is </a:t>
+              <a:t>GCC exception handling unwinds stack by running special </a:t>
+            </a:r>
+            <a:r>
+              <a:rPr lang="en-US" b="1" dirty="0" err="1" smtClean="0"/>
+              <a:t>bytecode</a:t>
+            </a:r>
+            <a:r>
+              <a:rPr lang="en-US" dirty="0" smtClean="0"/>
+              <a:t> in a VM; that VM is inside any GCC-built process runtime</a:t>
+            </a:r>
+          </a:p>
+          <a:p>
+            <a:r>
+              <a:rPr lang="en-US" dirty="0" smtClean="0"/>
+              <a:t>This </a:t>
+            </a:r>
+            <a:r>
+              <a:rPr lang="en-US" dirty="0" err="1" smtClean="0"/>
+              <a:t>bytecode</a:t>
+            </a:r>
+            <a:r>
+              <a:rPr lang="en-US" dirty="0" smtClean="0"/>
+              <a:t> is Turing-complete: you can write </a:t>
             </a:r>
             <a:r>
               <a:rPr lang="en-US" b="1" dirty="0" smtClean="0"/>
-              <a:t>not generic</a:t>
-            </a:r>
-            <a:r>
-              <a:rPr lang="en-US" dirty="0" smtClean="0"/>
-              <a:t> anymore</a:t>
-            </a:r>
-          </a:p>
-          <a:p>
-            <a:r>
-              <a:rPr lang="en-US" dirty="0" smtClean="0"/>
-              <a:t>There are different exploitation primitives in different contexts</a:t>
-            </a:r>
-          </a:p>
-          <a:p>
-            <a:r>
-              <a:rPr lang="en-US" dirty="0" smtClean="0"/>
-              <a:t>A modern exploitation technique shows how to take advantage of those primitives</a:t>
-            </a:r>
-          </a:p>
-          <a:p>
-            <a:r>
-              <a:rPr lang="en-US" dirty="0" smtClean="0"/>
-              <a:t>Targets as written are capable of many more computations that intended.  </a:t>
+              <a:t>any</a:t>
+            </a:r>
+            <a:r>
+              <a:rPr lang="en-US" dirty="0" smtClean="0"/>
+              <a:t> program in it</a:t>
+            </a:r>
+          </a:p>
+          <a:p>
+            <a:r>
+              <a:rPr lang="en-US" dirty="0" smtClean="0"/>
+              <a:t>Your non-native binary payload could use it!</a:t>
+            </a:r>
+          </a:p>
+          <a:p>
+            <a:r>
+              <a:rPr lang="en-US" b="1" dirty="0"/>
+              <a:t>M</a:t>
             </a:r>
             <a:r>
               <a:rPr lang="en-US" b="1" dirty="0" smtClean="0"/>
-              <a:t>Exploitation is proof of that</a:t>
-            </a:r>
-            <a:endParaRPr lang="en-US" b="1" dirty="0"/>
+              <a:t>emory leak</a:t>
+            </a:r>
+            <a:r>
+              <a:rPr lang="en-US" dirty="0" smtClean="0"/>
+              <a:t> to set it up + a </a:t>
+            </a:r>
+            <a:r>
+              <a:rPr lang="en-US" b="1" dirty="0" smtClean="0"/>
+              <a:t>write</a:t>
+            </a:r>
+            <a:r>
+              <a:rPr lang="en-US" dirty="0" smtClean="0"/>
+              <a:t> primitive</a:t>
+            </a:r>
+            <a:br>
+              <a:rPr lang="en-US" dirty="0" smtClean="0"/>
+            </a:br>
+            <a:r>
+              <a:rPr lang="en-US" dirty="0" smtClean="0"/>
+              <a:t>(then use our </a:t>
+            </a:r>
+            <a:r>
+              <a:rPr lang="en-US" i="1" dirty="0" smtClean="0"/>
+              <a:t>DWARF-only </a:t>
+            </a:r>
+            <a:r>
+              <a:rPr lang="en-US" i="1" dirty="0" err="1" smtClean="0"/>
+              <a:t>dyn</a:t>
+            </a:r>
+            <a:r>
+              <a:rPr lang="en-US" i="1" dirty="0" smtClean="0"/>
+              <a:t>. linker!</a:t>
+            </a:r>
+            <a:r>
+              <a:rPr lang="en-US" dirty="0" smtClean="0"/>
+              <a:t>) </a:t>
+            </a:r>
+            <a:endParaRPr lang="en-US" dirty="0"/>
           </a:p>
         </p:txBody>
       </p:sp>
     </p:spTree>
     <p:extLst>
       <p:ext uri="{BB962C8B-B14F-4D97-AF65-F5344CB8AC3E}">
-        <p14:creationId xmlns:p14="http://schemas.microsoft.com/office/powerpoint/2010/main" val="1190065990"/>
+        <p14:creationId xmlns:p14="http://schemas.microsoft.com/office/powerpoint/2010/main" val="1261883061"/>
       </p:ext>
     </p:extLst>
   </p:cSld>
   <p:clrMapOvr>
     <a:masterClrMapping/>
   </p:clrMapOvr>
-  <p:timing>
-    <p:tnLst>
-      <p:par>
-        <p:cTn xmlns:p14="http://schemas.microsoft.com/office/powerpoint/2010/main" id="1" dur="indefinite" restart="never" nodeType="tmRoot"/>
-      </p:par>
-    </p:tnLst>
-  </p:timing>
 </p:sld>
 </file>
 
@@ -10627,147 +10592,152 @@
             <p:ph idx="1"/>
           </p:nvPr>
         </p:nvSpPr>
-        <p:spPr/>
+        <p:spPr>
+          <a:xfrm>
+            <a:off x="457200" y="1417638"/>
+            <a:ext cx="8229600" cy="4525963"/>
+          </a:xfrm>
+        </p:spPr>
         <p:txBody>
           <a:bodyPr>
-            <a:normAutofit fontScale="47500" lnSpcReduction="20000"/>
+            <a:noAutofit/>
           </a:bodyPr>
           <a:lstStyle/>
           <a:p>
             <a:r>
-              <a:rPr lang="en-US" dirty="0" smtClean="0"/>
+              <a:rPr lang="en-US" sz="1700" dirty="0" smtClean="0"/>
               <a:t>8 cache entries for the frame header</a:t>
             </a:r>
           </a:p>
           <a:p>
             <a:pPr lvl="1"/>
             <a:r>
-              <a:rPr lang="en-US" dirty="0" smtClean="0"/>
+              <a:rPr lang="en-US" sz="1700" dirty="0" smtClean="0"/>
               <a:t>Uses a Least Used Replacement Algorithm (_</a:t>
             </a:r>
             <a:r>
-              <a:rPr lang="en-US" dirty="0" err="1" smtClean="0"/>
+              <a:rPr lang="en-US" sz="1700" dirty="0" err="1" smtClean="0"/>
               <a:t>Unwind_IteratePhdr_Callback</a:t>
             </a:r>
             <a:r>
-              <a:rPr lang="en-US" dirty="0" smtClean="0"/>
+              <a:rPr lang="en-US" sz="1700" dirty="0" smtClean="0"/>
               <a:t>())</a:t>
             </a:r>
           </a:p>
           <a:p>
             <a:pPr lvl="1"/>
             <a:r>
-              <a:rPr lang="en-US" dirty="0" smtClean="0"/>
+              <a:rPr lang="en-US" sz="1700" dirty="0" smtClean="0"/>
               <a:t>Most recently used is the head of the list</a:t>
             </a:r>
           </a:p>
           <a:p>
             <a:pPr lvl="1"/>
-            <a:endParaRPr lang="en-US" dirty="0"/>
-          </a:p>
-          <a:p>
-            <a:r>
-              <a:rPr lang="en-US" dirty="0" smtClean="0"/>
+            <a:endParaRPr lang="en-US" sz="1700" dirty="0"/>
+          </a:p>
+          <a:p>
+            <a:r>
+              <a:rPr lang="en-US" sz="1700" dirty="0" smtClean="0"/>
               <a:t>In the test environment, the </a:t>
             </a:r>
             <a:r>
-              <a:rPr lang="en-US" dirty="0" err="1" smtClean="0"/>
+              <a:rPr lang="en-US" sz="1700" dirty="0" err="1" smtClean="0"/>
               <a:t>frame_hdr_cache</a:t>
             </a:r>
             <a:r>
-              <a:rPr lang="en-US" dirty="0" smtClean="0"/>
+              <a:rPr lang="en-US" sz="1700" dirty="0" smtClean="0"/>
               <a:t> was at 0x6e0 bytes from the offset of the writable data segment of </a:t>
             </a:r>
             <a:r>
-              <a:rPr lang="en-US" dirty="0" err="1" smtClean="0"/>
+              <a:rPr lang="en-US" sz="1700" dirty="0" err="1" smtClean="0"/>
               <a:t>libgcc</a:t>
             </a:r>
-            <a:endParaRPr lang="en-US" dirty="0" smtClean="0"/>
-          </a:p>
-          <a:p>
-            <a:endParaRPr lang="en-US" dirty="0"/>
-          </a:p>
-          <a:p>
-            <a:r>
-              <a:rPr lang="en-US" dirty="0" smtClean="0"/>
+            <a:endParaRPr lang="en-US" sz="1700" dirty="0" smtClean="0"/>
+          </a:p>
+          <a:p>
+            <a:endParaRPr lang="en-US" sz="1700" dirty="0"/>
+          </a:p>
+          <a:p>
+            <a:r>
+              <a:rPr lang="en-US" sz="1700" dirty="0" smtClean="0"/>
               <a:t>This is the aforementioned array, with 48 bytes in size</a:t>
             </a:r>
           </a:p>
           <a:p>
-            <a:endParaRPr lang="en-US" dirty="0" smtClean="0"/>
-          </a:p>
-          <a:p>
-            <a:r>
-              <a:rPr lang="en-US" dirty="0" smtClean="0"/>
+            <a:endParaRPr lang="en-US" sz="1700" dirty="0" smtClean="0"/>
+          </a:p>
+          <a:p>
+            <a:r>
+              <a:rPr lang="en-US" sz="1700" dirty="0" smtClean="0"/>
               <a:t>The executable itself is the 3</a:t>
             </a:r>
             <a:r>
-              <a:rPr lang="en-US" baseline="30000" dirty="0" smtClean="0"/>
+              <a:rPr lang="en-US" sz="1700" baseline="30000" dirty="0" smtClean="0"/>
               <a:t>rd</a:t>
             </a:r>
             <a:r>
-              <a:rPr lang="en-US" dirty="0" smtClean="0"/>
+              <a:rPr lang="en-US" sz="1700" dirty="0" smtClean="0"/>
               <a:t> element of the array (the first two are the </a:t>
             </a:r>
             <a:r>
-              <a:rPr lang="en-US" dirty="0" err="1" smtClean="0"/>
+              <a:rPr lang="en-US" sz="1700" dirty="0" err="1" smtClean="0"/>
               <a:t>libgcc</a:t>
             </a:r>
             <a:r>
-              <a:rPr lang="en-US" dirty="0" smtClean="0"/>
+              <a:rPr lang="en-US" sz="1700" dirty="0" smtClean="0"/>
               <a:t> and </a:t>
             </a:r>
             <a:r>
-              <a:rPr lang="en-US" dirty="0" err="1" smtClean="0"/>
+              <a:rPr lang="en-US" sz="1700" dirty="0" err="1" smtClean="0"/>
               <a:t>libstdc</a:t>
             </a:r>
             <a:r>
-              <a:rPr lang="en-US" dirty="0" smtClean="0"/>
+              <a:rPr lang="en-US" sz="1700" dirty="0" smtClean="0"/>
               <a:t>++)</a:t>
             </a:r>
           </a:p>
           <a:p>
-            <a:endParaRPr lang="en-US" dirty="0"/>
-          </a:p>
-          <a:p>
-            <a:r>
-              <a:rPr lang="en-US" dirty="0" smtClean="0"/>
+            <a:endParaRPr lang="en-US" sz="1700" dirty="0"/>
+          </a:p>
+          <a:p>
+            <a:r>
+              <a:rPr lang="en-US" sz="1700" dirty="0" smtClean="0"/>
               <a:t>The offset for the writable data segment of </a:t>
             </a:r>
             <a:r>
-              <a:rPr lang="en-US" dirty="0" err="1" smtClean="0"/>
+              <a:rPr lang="en-US" sz="1700" dirty="0" err="1" smtClean="0"/>
               <a:t>libgcc</a:t>
             </a:r>
             <a:r>
-              <a:rPr lang="en-US" dirty="0" smtClean="0"/>
+              <a:rPr lang="en-US" sz="1700" dirty="0" smtClean="0"/>
               <a:t> can be found in this way (based in what we know):</a:t>
             </a:r>
           </a:p>
           <a:p>
             <a:pPr lvl="1"/>
             <a:r>
-              <a:rPr lang="en-US" dirty="0" smtClean="0"/>
+              <a:rPr lang="en-US" sz="1700" dirty="0" smtClean="0"/>
               <a:t>0x6e0+48*2=0x740</a:t>
             </a:r>
           </a:p>
           <a:p>
             <a:pPr lvl="1"/>
-            <a:endParaRPr lang="en-US" dirty="0"/>
-          </a:p>
-          <a:p>
-            <a:r>
-              <a:rPr lang="en-US" dirty="0" smtClean="0"/>
+            <a:endParaRPr lang="en-US" sz="1700" dirty="0"/>
+          </a:p>
+          <a:p>
+            <a:r>
+              <a:rPr lang="en-US" sz="1700" dirty="0" smtClean="0"/>
               <a:t>The entry </a:t>
             </a:r>
             <a:r>
-              <a:rPr lang="en-US" dirty="0" err="1" smtClean="0"/>
+              <a:rPr lang="en-US" sz="1700" dirty="0" err="1" smtClean="0"/>
               <a:t>p_eh_frame_hdr</a:t>
             </a:r>
             <a:r>
-              <a:rPr lang="en-US" dirty="0" smtClean="0"/>
+              <a:rPr lang="en-US" sz="1700" dirty="0" smtClean="0"/>
               <a:t> that we want to overwrite is at 24 bytes of this structure.</a:t>
             </a:r>
-            <a:endParaRPr lang="en-US" dirty="0"/>
+            <a:endParaRPr lang="en-US" sz="1700" dirty="0"/>
           </a:p>
         </p:txBody>
       </p:sp>
@@ -12109,11 +12079,7 @@
           <a:p>
             <a:r>
               <a:rPr lang="en-US" sz="2200" dirty="0" smtClean="0"/>
-              <a:t>With </a:t>
-            </a:r>
-            <a:r>
-              <a:rPr lang="en-US" sz="2200" dirty="0" smtClean="0"/>
-              <a:t>all the values, we redirect the execution:</a:t>
+              <a:t>With all the values, we redirect the execution:</a:t>
             </a:r>
           </a:p>
           <a:p>
@@ -12128,11 +12094,7 @@
             </a:r>
             <a:r>
               <a:rPr lang="en-US" sz="2200" dirty="0" smtClean="0"/>
-              <a:t> </a:t>
-            </a:r>
-            <a:r>
-              <a:rPr lang="en-US" sz="2200" dirty="0" smtClean="0"/>
-              <a:t>throws an exception</a:t>
+              <a:t> throws an exception</a:t>
             </a:r>
           </a:p>
           <a:p>
@@ -12361,7 +12323,11 @@
           <a:p>
             <a:r>
               <a:rPr lang="en-US" dirty="0" smtClean="0"/>
-              <a:t>THE END! Really is !</a:t>
+              <a:t>THE END! </a:t>
+            </a:r>
+            <a:r>
+              <a:rPr lang="en-US" dirty="0" smtClean="0"/>
+              <a:t>Really!</a:t>
             </a:r>
             <a:r>
               <a:rPr lang="en-US" dirty="0" smtClean="0"/>
@@ -12675,19 +12641,7 @@
             <a:pPr lvl="1"/>
             <a:r>
               <a:rPr lang="en-US" dirty="0" smtClean="0"/>
-              <a:t>Memory corruption, </a:t>
-            </a:r>
-            <a:r>
-              <a:rPr lang="en-US" dirty="0" smtClean="0"/>
-              <a:t>unexpected </a:t>
-            </a:r>
-            <a:r>
-              <a:rPr lang="en-US" dirty="0" smtClean="0"/>
-              <a:t>control flows, </a:t>
-            </a:r>
-            <a:r>
-              <a:rPr lang="en-US" dirty="0" smtClean="0"/>
-              <a:t>…</a:t>
+              <a:t>Memory corruption, unexpected control flows, …</a:t>
             </a:r>
           </a:p>
           <a:p>
@@ -12696,7 +12650,6 @@
               <a:rPr lang="en-US" dirty="0" smtClean="0"/>
               <a:t>From a formal model point of view, primitives supply extra state and/or transitions</a:t>
             </a:r>
-            <a:endParaRPr lang="en-US" dirty="0" smtClean="0"/>
           </a:p>
           <a:p>
             <a:pPr marL="457200" lvl="1" indent="0">
@@ -12711,8 +12664,9 @@
             </a:r>
             <a:r>
               <a:rPr lang="en-US" dirty="0" smtClean="0"/>
-              <a:t>unleashed</a:t>
-            </a:r>
+              <a:t>constructed from primitives</a:t>
+            </a:r>
+            <a:endParaRPr lang="en-US" dirty="0" smtClean="0"/>
           </a:p>
           <a:p>
             <a:pPr lvl="1"/>
@@ -12787,7 +12741,12 @@
             <p:ph type="title"/>
           </p:nvPr>
         </p:nvSpPr>
-        <p:spPr/>
+        <p:spPr>
+          <a:xfrm>
+            <a:off x="457200" y="20643"/>
+            <a:ext cx="8229600" cy="1143000"/>
+          </a:xfrm>
+        </p:spPr>
         <p:txBody>
           <a:bodyPr/>
           <a:lstStyle/>
@@ -12899,7 +12858,7 @@
         <p:spPr/>
         <p:txBody>
           <a:bodyPr>
-            <a:normAutofit fontScale="92500" lnSpcReduction="10000"/>
+            <a:normAutofit lnSpcReduction="10000"/>
           </a:bodyPr>
           <a:lstStyle/>
           <a:p>
@@ -12914,8 +12873,49 @@
           <a:p>
             <a:r>
               <a:rPr lang="en-US" dirty="0" smtClean="0"/>
-              <a:t>There are many computations inside a program that can be used to subvert the code execution (and some of then has nothing to do with the original code itself)</a:t>
-            </a:r>
+              <a:t>There are many </a:t>
+            </a:r>
+            <a:r>
+              <a:rPr lang="en-US" b="1" dirty="0" smtClean="0"/>
+              <a:t>auxiliary computations</a:t>
+            </a:r>
+            <a:r>
+              <a:rPr lang="en-US" dirty="0" smtClean="0"/>
+              <a:t> </a:t>
+            </a:r>
+            <a:r>
+              <a:rPr lang="en-US" dirty="0" smtClean="0"/>
+              <a:t>inside a </a:t>
+            </a:r>
+            <a:r>
+              <a:rPr lang="en-US" dirty="0" smtClean="0"/>
+              <a:t>process/runtime </a:t>
+            </a:r>
+            <a:r>
+              <a:rPr lang="en-US" dirty="0" smtClean="0"/>
+              <a:t>that can be used to </a:t>
+            </a:r>
+            <a:r>
+              <a:rPr lang="en-US" dirty="0" smtClean="0"/>
+              <a:t>subvert code </a:t>
+            </a:r>
+            <a:r>
+              <a:rPr lang="en-US" dirty="0" smtClean="0"/>
+              <a:t>execution (and some of then </a:t>
+            </a:r>
+            <a:r>
+              <a:rPr lang="en-US" dirty="0" smtClean="0"/>
+              <a:t>have </a:t>
+            </a:r>
+            <a:r>
+              <a:rPr lang="en-US" dirty="0" smtClean="0"/>
+              <a:t>nothing to do with the original </a:t>
+            </a:r>
+            <a:r>
+              <a:rPr lang="en-US" dirty="0" smtClean="0"/>
+              <a:t>code)</a:t>
+            </a:r>
+            <a:endParaRPr lang="en-US" dirty="0" smtClean="0"/>
           </a:p>
           <a:p>
             <a:endParaRPr lang="en-US" dirty="0"/>
@@ -12923,7 +12923,15 @@
           <a:p>
             <a:r>
               <a:rPr lang="en-US" dirty="0" smtClean="0"/>
-              <a:t>ROP is not new, exploits are using it since 2000 (maybe even before)</a:t>
+              <a:t>This isn’t like ROP, we are borrowing </a:t>
+            </a:r>
+            <a:r>
+              <a:rPr lang="en-US" dirty="0" smtClean="0"/>
+              <a:t>an existing machine fully (but in unexpected way)</a:t>
+            </a:r>
+            <a:r>
+              <a:rPr lang="en-US" dirty="0" smtClean="0"/>
+              <a:t> </a:t>
             </a:r>
             <a:endParaRPr lang="en-US" dirty="0"/>
           </a:p>

</xml_diff>